<commit_message>
Updating written work - made start on academic poster
need to finish by end of FEB (add visuals/images)
</commit_message>
<xml_diff>
--- a/Diabetes prediction with machine learning and explainable ai poster.pptx
+++ b/Diabetes prediction with machine learning and explainable ai poster.pptx
@@ -208,7 +208,7 @@
           <a:p>
             <a:fld id="{8166CC95-0DBE-4CD7-89B3-7ACCE4BCDAF1}" type="datetimeFigureOut">
               <a:rPr lang="en-GB" smtClean="0"/>
-              <a:t>15/02/2025</a:t>
+              <a:t>17/02/2025</a:t>
             </a:fld>
             <a:endParaRPr lang="en-GB"/>
           </a:p>
@@ -696,7 +696,7 @@
           <a:p>
             <a:fld id="{49E4927F-ADE1-49CD-A2B9-CD8CCD18392F}" type="datetimeFigureOut">
               <a:rPr lang="en-GB" smtClean="0"/>
-              <a:t>15/02/2025</a:t>
+              <a:t>17/02/2025</a:t>
             </a:fld>
             <a:endParaRPr lang="en-GB"/>
           </a:p>
@@ -866,7 +866,7 @@
           <a:p>
             <a:fld id="{49E4927F-ADE1-49CD-A2B9-CD8CCD18392F}" type="datetimeFigureOut">
               <a:rPr lang="en-GB" smtClean="0"/>
-              <a:t>15/02/2025</a:t>
+              <a:t>17/02/2025</a:t>
             </a:fld>
             <a:endParaRPr lang="en-GB"/>
           </a:p>
@@ -1046,7 +1046,7 @@
           <a:p>
             <a:fld id="{49E4927F-ADE1-49CD-A2B9-CD8CCD18392F}" type="datetimeFigureOut">
               <a:rPr lang="en-GB" smtClean="0"/>
-              <a:t>15/02/2025</a:t>
+              <a:t>17/02/2025</a:t>
             </a:fld>
             <a:endParaRPr lang="en-GB"/>
           </a:p>
@@ -1216,7 +1216,7 @@
           <a:p>
             <a:fld id="{49E4927F-ADE1-49CD-A2B9-CD8CCD18392F}" type="datetimeFigureOut">
               <a:rPr lang="en-GB" smtClean="0"/>
-              <a:t>15/02/2025</a:t>
+              <a:t>17/02/2025</a:t>
             </a:fld>
             <a:endParaRPr lang="en-GB"/>
           </a:p>
@@ -1462,7 +1462,7 @@
           <a:p>
             <a:fld id="{49E4927F-ADE1-49CD-A2B9-CD8CCD18392F}" type="datetimeFigureOut">
               <a:rPr lang="en-GB" smtClean="0"/>
-              <a:t>15/02/2025</a:t>
+              <a:t>17/02/2025</a:t>
             </a:fld>
             <a:endParaRPr lang="en-GB"/>
           </a:p>
@@ -1694,7 +1694,7 @@
           <a:p>
             <a:fld id="{49E4927F-ADE1-49CD-A2B9-CD8CCD18392F}" type="datetimeFigureOut">
               <a:rPr lang="en-GB" smtClean="0"/>
-              <a:t>15/02/2025</a:t>
+              <a:t>17/02/2025</a:t>
             </a:fld>
             <a:endParaRPr lang="en-GB"/>
           </a:p>
@@ -2061,7 +2061,7 @@
           <a:p>
             <a:fld id="{49E4927F-ADE1-49CD-A2B9-CD8CCD18392F}" type="datetimeFigureOut">
               <a:rPr lang="en-GB" smtClean="0"/>
-              <a:t>15/02/2025</a:t>
+              <a:t>17/02/2025</a:t>
             </a:fld>
             <a:endParaRPr lang="en-GB"/>
           </a:p>
@@ -2179,7 +2179,7 @@
           <a:p>
             <a:fld id="{49E4927F-ADE1-49CD-A2B9-CD8CCD18392F}" type="datetimeFigureOut">
               <a:rPr lang="en-GB" smtClean="0"/>
-              <a:t>15/02/2025</a:t>
+              <a:t>17/02/2025</a:t>
             </a:fld>
             <a:endParaRPr lang="en-GB"/>
           </a:p>
@@ -2274,7 +2274,7 @@
           <a:p>
             <a:fld id="{49E4927F-ADE1-49CD-A2B9-CD8CCD18392F}" type="datetimeFigureOut">
               <a:rPr lang="en-GB" smtClean="0"/>
-              <a:t>15/02/2025</a:t>
+              <a:t>17/02/2025</a:t>
             </a:fld>
             <a:endParaRPr lang="en-GB"/>
           </a:p>
@@ -2551,7 +2551,7 @@
           <a:p>
             <a:fld id="{49E4927F-ADE1-49CD-A2B9-CD8CCD18392F}" type="datetimeFigureOut">
               <a:rPr lang="en-GB" smtClean="0"/>
-              <a:t>15/02/2025</a:t>
+              <a:t>17/02/2025</a:t>
             </a:fld>
             <a:endParaRPr lang="en-GB"/>
           </a:p>
@@ -2808,7 +2808,7 @@
           <a:p>
             <a:fld id="{49E4927F-ADE1-49CD-A2B9-CD8CCD18392F}" type="datetimeFigureOut">
               <a:rPr lang="en-GB" smtClean="0"/>
-              <a:t>15/02/2025</a:t>
+              <a:t>17/02/2025</a:t>
             </a:fld>
             <a:endParaRPr lang="en-GB"/>
           </a:p>
@@ -3021,7 +3021,7 @@
           <a:p>
             <a:fld id="{49E4927F-ADE1-49CD-A2B9-CD8CCD18392F}" type="datetimeFigureOut">
               <a:rPr lang="en-GB" smtClean="0"/>
-              <a:t>15/02/2025</a:t>
+              <a:t>17/02/2025</a:t>
             </a:fld>
             <a:endParaRPr lang="en-GB"/>
           </a:p>
@@ -3441,7 +3441,7 @@
         <p:spPr>
           <a:xfrm>
             <a:off x="412750" y="1502722"/>
-            <a:ext cx="8197850" cy="3733839"/>
+            <a:ext cx="8197850" cy="3856678"/>
           </a:xfrm>
           <a:prstGeom prst="rect">
             <a:avLst/>
@@ -3474,6 +3474,62 @@
               <a:t>Abstract</a:t>
             </a:r>
           </a:p>
+          <a:p>
+            <a:r>
+              <a:rPr lang="en-US" dirty="0">
+                <a:latin typeface="Times New Roman" panose="02020603050405020304" pitchFamily="18" charset="0"/>
+                <a:cs typeface="Times New Roman" panose="02020603050405020304" pitchFamily="18" charset="0"/>
+              </a:rPr>
+              <a:t>The World Health </a:t>
+            </a:r>
+            <a:r>
+              <a:rPr lang="en-US" dirty="0" err="1">
+                <a:latin typeface="Times New Roman" panose="02020603050405020304" pitchFamily="18" charset="0"/>
+                <a:cs typeface="Times New Roman" panose="02020603050405020304" pitchFamily="18" charset="0"/>
+              </a:rPr>
+              <a:t>Organisation</a:t>
+            </a:r>
+            <a:r>
+              <a:rPr lang="en-US" dirty="0">
+                <a:latin typeface="Times New Roman" panose="02020603050405020304" pitchFamily="18" charset="0"/>
+                <a:cs typeface="Times New Roman" panose="02020603050405020304" pitchFamily="18" charset="0"/>
+              </a:rPr>
+              <a:t> defines diabetes as a chronic disease where the pancreas produces insufficient insulin or the body cannot use it effectively, leading to serious health complications. [1] In 2023, the National Diabetes Audit reported 3,615,330 GP-registered cases of pre-diabetes (</a:t>
+            </a:r>
+            <a:r>
+              <a:rPr lang="en-US" dirty="0" err="1">
+                <a:latin typeface="Times New Roman" panose="02020603050405020304" pitchFamily="18" charset="0"/>
+                <a:cs typeface="Times New Roman" panose="02020603050405020304" pitchFamily="18" charset="0"/>
+              </a:rPr>
+              <a:t>hyperglycaemia</a:t>
+            </a:r>
+            <a:r>
+              <a:rPr lang="en-US" dirty="0">
+                <a:latin typeface="Times New Roman" panose="02020603050405020304" pitchFamily="18" charset="0"/>
+                <a:cs typeface="Times New Roman" panose="02020603050405020304" pitchFamily="18" charset="0"/>
+              </a:rPr>
+              <a:t>), an 18% increase from 2022. [2]</a:t>
+            </a:r>
+          </a:p>
+          <a:p>
+            <a:endParaRPr lang="en-US" dirty="0">
+              <a:latin typeface="Times New Roman" panose="02020603050405020304" pitchFamily="18" charset="0"/>
+              <a:cs typeface="Times New Roman" panose="02020603050405020304" pitchFamily="18" charset="0"/>
+            </a:endParaRPr>
+          </a:p>
+          <a:p>
+            <a:r>
+              <a:rPr lang="en-US" dirty="0">
+                <a:latin typeface="Times New Roman" panose="02020603050405020304" pitchFamily="18" charset="0"/>
+                <a:cs typeface="Times New Roman" panose="02020603050405020304" pitchFamily="18" charset="0"/>
+              </a:rPr>
+              <a:t>This research integrates Explainable AI (XAI) with machine learning (ML) to enhance diabetes prediction. It evaluates Random Forest, Logistic Regression, and Gradient Boosting Machine (GBM) models using LIME for interpretability. A real-time toggle feature improves accessibility, allowing users to interact with model explanations dynamically. Findings will identify the most effective ML-XAI approach for accurate, interpretable, and actionable predictions, enhancing trust in AI-driven healthcare.</a:t>
+            </a:r>
+            <a:endParaRPr lang="en-GB" b="1" u="sng" dirty="0">
+              <a:latin typeface="Times New Roman" panose="02020603050405020304" pitchFamily="18" charset="0"/>
+              <a:cs typeface="Times New Roman" panose="02020603050405020304" pitchFamily="18" charset="0"/>
+            </a:endParaRPr>
+          </a:p>
         </p:txBody>
       </p:sp>
       <p:sp>
@@ -3491,7 +3547,7 @@
         <p:spPr>
           <a:xfrm>
             <a:off x="412750" y="5610380"/>
-            <a:ext cx="6885551" cy="5806920"/>
+            <a:ext cx="6885551" cy="4402300"/>
           </a:xfrm>
           <a:prstGeom prst="rect">
             <a:avLst/>
@@ -3524,6 +3580,36 @@
               <a:t>Introduction</a:t>
             </a:r>
           </a:p>
+          <a:p>
+            <a:r>
+              <a:rPr lang="en-US" dirty="0">
+                <a:latin typeface="Times New Roman" panose="02020603050405020304" pitchFamily="18" charset="0"/>
+                <a:cs typeface="Times New Roman" panose="02020603050405020304" pitchFamily="18" charset="0"/>
+              </a:rPr>
+              <a:t>Diabetes is a widespread chronic condition where early detection plays a key role in effective management. While machine learning (ML) models offer promising predictive capabilities, their complexity can limit trust and adoption in healthcare. To address this, Explainable AI (XAI) techniques can enhance transparency, making AI-driven predictions more interpretable.</a:t>
+            </a:r>
+          </a:p>
+          <a:p>
+            <a:endParaRPr lang="en-US" dirty="0">
+              <a:latin typeface="Times New Roman" panose="02020603050405020304" pitchFamily="18" charset="0"/>
+              <a:cs typeface="Times New Roman" panose="02020603050405020304" pitchFamily="18" charset="0"/>
+            </a:endParaRPr>
+          </a:p>
+          <a:p>
+            <a:r>
+              <a:rPr lang="en-US" dirty="0">
+                <a:latin typeface="Times New Roman" panose="02020603050405020304" pitchFamily="18" charset="0"/>
+                <a:cs typeface="Times New Roman" panose="02020603050405020304" pitchFamily="18" charset="0"/>
+              </a:rPr>
+              <a:t>This study integrates Random Forest (RF), Logistic Regression (LG), and Gradient Boosting Machine (GBM) models with Local Interpretable Model-Agnostic Explanations (LIME) to provide insight into diabetes predictions. By incorporating these models into a web and mobile application, this research aims to improve accessibility, empower users with explainable results, and bridge the gap between AI-driven and traditional diagnostics.</a:t>
+            </a:r>
+          </a:p>
+          <a:p>
+            <a:endParaRPr lang="en-GB" dirty="0">
+              <a:latin typeface="Times New Roman" panose="02020603050405020304" pitchFamily="18" charset="0"/>
+              <a:cs typeface="Times New Roman" panose="02020603050405020304" pitchFamily="18" charset="0"/>
+            </a:endParaRPr>
+          </a:p>
         </p:txBody>
       </p:sp>
       <p:sp>
@@ -3541,7 +3627,7 @@
         <p:spPr>
           <a:xfrm>
             <a:off x="8924953" y="1502722"/>
-            <a:ext cx="5781647" cy="3733839"/>
+            <a:ext cx="5781647" cy="3856678"/>
           </a:xfrm>
           <a:prstGeom prst="rect">
             <a:avLst/>
@@ -3574,6 +3660,125 @@
               <a:t>Technologies</a:t>
             </a:r>
           </a:p>
+          <a:p>
+            <a:pPr marL="0" indent="0">
+              <a:buNone/>
+            </a:pPr>
+            <a:r>
+              <a:rPr lang="en-GB" b="1" u="sng" dirty="0">
+                <a:latin typeface="Times New Roman" panose="02020603050405020304" pitchFamily="18" charset="0"/>
+                <a:cs typeface="Times New Roman" panose="02020603050405020304" pitchFamily="18" charset="0"/>
+              </a:rPr>
+              <a:t>Frontend Framework</a:t>
+            </a:r>
+          </a:p>
+          <a:p>
+            <a:r>
+              <a:rPr lang="en-GB" dirty="0">
+                <a:latin typeface="Times New Roman" panose="02020603050405020304" pitchFamily="18" charset="0"/>
+                <a:cs typeface="Times New Roman" panose="02020603050405020304" pitchFamily="18" charset="0"/>
+              </a:rPr>
+              <a:t>React Native Expo (mobile and web development)</a:t>
+            </a:r>
+          </a:p>
+          <a:p>
+            <a:endParaRPr lang="en-GB" dirty="0">
+              <a:latin typeface="Times New Roman" panose="02020603050405020304" pitchFamily="18" charset="0"/>
+              <a:cs typeface="Times New Roman" panose="02020603050405020304" pitchFamily="18" charset="0"/>
+            </a:endParaRPr>
+          </a:p>
+          <a:p>
+            <a:pPr marL="0" indent="0">
+              <a:buNone/>
+            </a:pPr>
+            <a:r>
+              <a:rPr lang="en-GB" b="1" u="sng" dirty="0">
+                <a:latin typeface="Times New Roman" panose="02020603050405020304" pitchFamily="18" charset="0"/>
+                <a:cs typeface="Times New Roman" panose="02020603050405020304" pitchFamily="18" charset="0"/>
+              </a:rPr>
+              <a:t>Visualisation Libraries</a:t>
+            </a:r>
+          </a:p>
+          <a:p>
+            <a:r>
+              <a:rPr lang="en-GB" dirty="0">
+                <a:latin typeface="Times New Roman" panose="02020603050405020304" pitchFamily="18" charset="0"/>
+                <a:cs typeface="Times New Roman" panose="02020603050405020304" pitchFamily="18" charset="0"/>
+              </a:rPr>
+              <a:t>Chart.js and/or </a:t>
+            </a:r>
+            <a:r>
+              <a:rPr lang="en-GB" dirty="0" err="1">
+                <a:latin typeface="Times New Roman" panose="02020603050405020304" pitchFamily="18" charset="0"/>
+                <a:cs typeface="Times New Roman" panose="02020603050405020304" pitchFamily="18" charset="0"/>
+              </a:rPr>
+              <a:t>Plotly</a:t>
+            </a:r>
+            <a:r>
+              <a:rPr lang="en-GB" dirty="0">
+                <a:latin typeface="Times New Roman" panose="02020603050405020304" pitchFamily="18" charset="0"/>
+                <a:cs typeface="Times New Roman" panose="02020603050405020304" pitchFamily="18" charset="0"/>
+              </a:rPr>
+              <a:t> for displaying LIME and homepage visualisation</a:t>
+            </a:r>
+          </a:p>
+          <a:p>
+            <a:endParaRPr lang="en-GB" dirty="0">
+              <a:latin typeface="Times New Roman" panose="02020603050405020304" pitchFamily="18" charset="0"/>
+              <a:cs typeface="Times New Roman" panose="02020603050405020304" pitchFamily="18" charset="0"/>
+            </a:endParaRPr>
+          </a:p>
+          <a:p>
+            <a:pPr marL="0" indent="0">
+              <a:buNone/>
+            </a:pPr>
+            <a:r>
+              <a:rPr lang="en-GB" b="1" u="sng" dirty="0">
+                <a:latin typeface="Times New Roman" panose="02020603050405020304" pitchFamily="18" charset="0"/>
+                <a:cs typeface="Times New Roman" panose="02020603050405020304" pitchFamily="18" charset="0"/>
+              </a:rPr>
+              <a:t>Backend Integration</a:t>
+            </a:r>
+          </a:p>
+          <a:p>
+            <a:r>
+              <a:rPr lang="en-GB" dirty="0">
+                <a:latin typeface="Times New Roman" panose="02020603050405020304" pitchFamily="18" charset="0"/>
+                <a:cs typeface="Times New Roman" panose="02020603050405020304" pitchFamily="18" charset="0"/>
+              </a:rPr>
+              <a:t>Flask Python Application connecting frontend to ML and XAI components</a:t>
+            </a:r>
+          </a:p>
+          <a:p>
+            <a:endParaRPr lang="en-GB" dirty="0">
+              <a:latin typeface="Times New Roman" panose="02020603050405020304" pitchFamily="18" charset="0"/>
+              <a:cs typeface="Times New Roman" panose="02020603050405020304" pitchFamily="18" charset="0"/>
+            </a:endParaRPr>
+          </a:p>
+          <a:p>
+            <a:pPr marL="0" indent="0">
+              <a:buNone/>
+            </a:pPr>
+            <a:r>
+              <a:rPr lang="en-GB" b="1" u="sng" dirty="0">
+                <a:latin typeface="Times New Roman" panose="02020603050405020304" pitchFamily="18" charset="0"/>
+                <a:cs typeface="Times New Roman" panose="02020603050405020304" pitchFamily="18" charset="0"/>
+              </a:rPr>
+              <a:t>Deployment</a:t>
+            </a:r>
+          </a:p>
+          <a:p>
+            <a:endParaRPr lang="en-GB" sz="2000" dirty="0">
+              <a:latin typeface="Times New Roman" panose="02020603050405020304" pitchFamily="18" charset="0"/>
+              <a:cs typeface="Times New Roman" panose="02020603050405020304" pitchFamily="18" charset="0"/>
+            </a:endParaRPr>
+          </a:p>
+          <a:p>
+            <a:endParaRPr lang="en-GB" sz="2000" dirty="0">
+              <a:latin typeface="Times New Roman" panose="02020603050405020304" pitchFamily="18" charset="0"/>
+              <a:cs typeface="Times New Roman" panose="02020603050405020304" pitchFamily="18" charset="0"/>
+            </a:endParaRPr>
+          </a:p>
         </p:txBody>
       </p:sp>
       <p:sp>
@@ -3591,7 +3796,7 @@
         <p:spPr>
           <a:xfrm>
             <a:off x="7559674" y="5610380"/>
-            <a:ext cx="7146926" cy="5806920"/>
+            <a:ext cx="7146926" cy="4653280"/>
           </a:xfrm>
           <a:prstGeom prst="rect">
             <a:avLst/>
@@ -3624,6 +3829,49 @@
               <a:t>Methodology</a:t>
             </a:r>
           </a:p>
+          <a:p>
+            <a:r>
+              <a:rPr lang="en-US" dirty="0">
+                <a:latin typeface="Times New Roman" panose="02020603050405020304" pitchFamily="18" charset="0"/>
+                <a:cs typeface="Times New Roman" panose="02020603050405020304" pitchFamily="18" charset="0"/>
+              </a:rPr>
+              <a:t>This study utilizes machine learning (ML) models to predict diabetes while integrating Explainable AI (XAI) to enhance interpretability. Three ML models—Random Forest (RF), Logistic Regression (LG), and Gradient Boosting Machine (GBM)—were trained on the Pima Indian Diabetes Dataset to classify patients based on risk factors.</a:t>
+            </a:r>
+          </a:p>
+          <a:p>
+            <a:endParaRPr lang="en-US" dirty="0">
+              <a:latin typeface="Times New Roman" panose="02020603050405020304" pitchFamily="18" charset="0"/>
+              <a:cs typeface="Times New Roman" panose="02020603050405020304" pitchFamily="18" charset="0"/>
+            </a:endParaRPr>
+          </a:p>
+          <a:p>
+            <a:r>
+              <a:rPr lang="en-US" dirty="0">
+                <a:latin typeface="Times New Roman" panose="02020603050405020304" pitchFamily="18" charset="0"/>
+                <a:cs typeface="Times New Roman" panose="02020603050405020304" pitchFamily="18" charset="0"/>
+              </a:rPr>
+              <a:t>To improve transparency, Local Interpretable Model-Agnostic Explanations (LIME) was applied, allowing for instance-level explanations of model predictions. The models were evaluated using performance metrics such as accuracy, precision, recall, and F1-score.</a:t>
+            </a:r>
+          </a:p>
+          <a:p>
+            <a:endParaRPr lang="en-US" dirty="0">
+              <a:latin typeface="Times New Roman" panose="02020603050405020304" pitchFamily="18" charset="0"/>
+              <a:cs typeface="Times New Roman" panose="02020603050405020304" pitchFamily="18" charset="0"/>
+            </a:endParaRPr>
+          </a:p>
+          <a:p>
+            <a:r>
+              <a:rPr lang="en-US" dirty="0">
+                <a:latin typeface="Times New Roman" panose="02020603050405020304" pitchFamily="18" charset="0"/>
+                <a:cs typeface="Times New Roman" panose="02020603050405020304" pitchFamily="18" charset="0"/>
+              </a:rPr>
+              <a:t>The final model was integrated into a web and mobile application, ensuring accessibility for both healthcare professionals and general users. This approach bridges the gap between AI-driven diagnostics and user trust, making predictive insights more interpretable and actionable.</a:t>
+            </a:r>
+            <a:endParaRPr lang="en-GB" dirty="0">
+              <a:latin typeface="Times New Roman" panose="02020603050405020304" pitchFamily="18" charset="0"/>
+              <a:cs typeface="Times New Roman" panose="02020603050405020304" pitchFamily="18" charset="0"/>
+            </a:endParaRPr>
+          </a:p>
         </p:txBody>
       </p:sp>
       <p:sp>
@@ -3640,8 +3888,8 @@
         </p:nvSpPr>
         <p:spPr>
           <a:xfrm>
-            <a:off x="412750" y="11791119"/>
-            <a:ext cx="6885551" cy="8033429"/>
+            <a:off x="412749" y="10263660"/>
+            <a:ext cx="6885551" cy="8431844"/>
           </a:xfrm>
           <a:prstGeom prst="rect">
             <a:avLst/>
@@ -3690,8 +3938,8 @@
         </p:nvSpPr>
         <p:spPr>
           <a:xfrm>
-            <a:off x="7559674" y="18105444"/>
-            <a:ext cx="7146926" cy="1719103"/>
+            <a:off x="412749" y="18804835"/>
+            <a:ext cx="14293851" cy="1619262"/>
           </a:xfrm>
           <a:prstGeom prst="rect">
             <a:avLst/>
@@ -3724,6 +3972,51 @@
               <a:t>References</a:t>
             </a:r>
           </a:p>
+          <a:p>
+            <a:r>
+              <a:rPr lang="en-GB" sz="1600" dirty="0">
+                <a:latin typeface="Times New Roman" panose="02020603050405020304" pitchFamily="18" charset="0"/>
+                <a:cs typeface="Times New Roman" panose="02020603050405020304" pitchFamily="18" charset="0"/>
+              </a:rPr>
+              <a:t>[1] </a:t>
+            </a:r>
+            <a:r>
+              <a:rPr lang="en-GB" sz="1600" kern="100" dirty="0">
+                <a:effectLst/>
+                <a:latin typeface="Times New Roman" panose="02020603050405020304" pitchFamily="18" charset="0"/>
+                <a:cs typeface="Times New Roman" panose="02020603050405020304" pitchFamily="18" charset="0"/>
+              </a:rPr>
+              <a:t>W. H. Organisation, “Diabetes,” 14 November 2024. [Online]. Available: https://www.who.int/news-room/fact-sheets/detail/diabetes. [Accessed 9 December 2024].</a:t>
+            </a:r>
+            <a:endParaRPr lang="en-GB" sz="1600" kern="100" dirty="0">
+              <a:effectLst/>
+              <a:latin typeface="Times New Roman" panose="02020603050405020304" pitchFamily="18" charset="0"/>
+              <a:ea typeface="Aptos" panose="020B0004020202020204" pitchFamily="34" charset="0"/>
+              <a:cs typeface="Times New Roman" panose="02020603050405020304" pitchFamily="18" charset="0"/>
+            </a:endParaRPr>
+          </a:p>
+          <a:p>
+            <a:r>
+              <a:rPr lang="en-GB" sz="1600" dirty="0">
+                <a:latin typeface="Times New Roman" panose="02020603050405020304" pitchFamily="18" charset="0"/>
+                <a:cs typeface="Times New Roman" panose="02020603050405020304" pitchFamily="18" charset="0"/>
+              </a:rPr>
+              <a:t>[2] </a:t>
+            </a:r>
+            <a:r>
+              <a:rPr lang="en-US" sz="1600" dirty="0">
+                <a:latin typeface="Times New Roman" panose="02020603050405020304" pitchFamily="18" charset="0"/>
+                <a:cs typeface="Times New Roman" panose="02020603050405020304" pitchFamily="18" charset="0"/>
+              </a:rPr>
+              <a:t>N. England, “NHS identifies over half a million more people at risk of type 2 diabetes in a Year,” 12 June 2024. [Online]. Available: https://www.england.nhs.uk/2024/06/nhs-identifies-over-half-a-million-more-people-at-risk-of-type-2-diabetes-in-a-year/. [Accessed 9 December 2024].</a:t>
+            </a:r>
+          </a:p>
+          <a:p>
+            <a:endParaRPr lang="en-GB" sz="1600" dirty="0">
+              <a:latin typeface="Times New Roman" panose="02020603050405020304" pitchFamily="18" charset="0"/>
+              <a:cs typeface="Times New Roman" panose="02020603050405020304" pitchFamily="18" charset="0"/>
+            </a:endParaRPr>
+          </a:p>
         </p:txBody>
       </p:sp>
       <p:sp>
@@ -3740,8 +4033,8 @@
         </p:nvSpPr>
         <p:spPr>
           <a:xfrm>
-            <a:off x="7559674" y="14270927"/>
-            <a:ext cx="7146926" cy="3645012"/>
+            <a:off x="7559674" y="14928574"/>
+            <a:ext cx="7146926" cy="3766929"/>
           </a:xfrm>
           <a:prstGeom prst="rect">
             <a:avLst/>
@@ -3774,6 +4067,12 @@
               <a:t>Recommendations</a:t>
             </a:r>
           </a:p>
+          <a:p>
+            <a:endParaRPr lang="en-GB" sz="2000" dirty="0">
+              <a:latin typeface="Times New Roman" panose="02020603050405020304" pitchFamily="18" charset="0"/>
+              <a:cs typeface="Times New Roman" panose="02020603050405020304" pitchFamily="18" charset="0"/>
+            </a:endParaRPr>
+          </a:p>
         </p:txBody>
       </p:sp>
       <p:sp>
@@ -3791,7 +4090,7 @@
         <p:spPr>
           <a:xfrm>
             <a:off x="7559674" y="11791119"/>
-            <a:ext cx="7146926" cy="2290303"/>
+            <a:ext cx="7146926" cy="3028123"/>
           </a:xfrm>
           <a:prstGeom prst="rect">
             <a:avLst/>
@@ -3899,6 +4198,60 @@
               </a:rPr>
               <a:t>Tayyeba Sadaq – 100611584 – University of Derby – BSc Computer Science</a:t>
             </a:r>
+          </a:p>
+        </p:txBody>
+      </p:sp>
+      <p:sp>
+        <p:nvSpPr>
+          <p:cNvPr id="8" name="TextBox 7">
+            <a:extLst>
+              <a:ext uri="{FF2B5EF4-FFF2-40B4-BE49-F238E27FC236}">
+                <a16:creationId xmlns:a16="http://schemas.microsoft.com/office/drawing/2014/main" id="{4F06A22E-37DB-E21D-B860-3A0841996022}"/>
+              </a:ext>
+            </a:extLst>
+          </p:cNvPr>
+          <p:cNvSpPr txBox="1"/>
+          <p:nvPr/>
+        </p:nvSpPr>
+        <p:spPr>
+          <a:xfrm>
+            <a:off x="9760806" y="10427225"/>
+            <a:ext cx="2744662" cy="1200329"/>
+          </a:xfrm>
+          <a:prstGeom prst="rect">
+            <a:avLst/>
+          </a:prstGeom>
+          <a:noFill/>
+        </p:spPr>
+        <p:txBody>
+          <a:bodyPr wrap="none" rtlCol="0">
+            <a:spAutoFit/>
+          </a:bodyPr>
+          <a:lstStyle/>
+          <a:p>
+            <a:r>
+              <a:rPr lang="en-US" dirty="0"/>
+              <a:t>VISUALISATIONS TO ADD:</a:t>
+            </a:r>
+          </a:p>
+          <a:p>
+            <a:r>
+              <a:rPr lang="en-US" dirty="0"/>
+              <a:t>1. ARCHITECTURE</a:t>
+            </a:r>
+          </a:p>
+          <a:p>
+            <a:r>
+              <a:rPr lang="en-US" dirty="0"/>
+              <a:t>2. RESULTS EXAMPLE</a:t>
+            </a:r>
+          </a:p>
+          <a:p>
+            <a:r>
+              <a:rPr lang="en-US" dirty="0"/>
+              <a:t>3. UI OF WEBSITE</a:t>
+            </a:r>
+            <a:endParaRPr lang="en-GB" dirty="0"/>
           </a:p>
         </p:txBody>
       </p:sp>

</xml_diff>

<commit_message>
added notes from meeting
</commit_message>
<xml_diff>
--- a/Diabetes prediction with machine learning and explainable ai poster.pptx
+++ b/Diabetes prediction with machine learning and explainable ai poster.pptx
@@ -208,7 +208,7 @@
           <a:p>
             <a:fld id="{8166CC95-0DBE-4CD7-89B3-7ACCE4BCDAF1}" type="datetimeFigureOut">
               <a:rPr lang="en-GB" smtClean="0"/>
-              <a:t>17/02/2025</a:t>
+              <a:t>18/02/2025</a:t>
             </a:fld>
             <a:endParaRPr lang="en-GB"/>
           </a:p>
@@ -696,7 +696,7 @@
           <a:p>
             <a:fld id="{49E4927F-ADE1-49CD-A2B9-CD8CCD18392F}" type="datetimeFigureOut">
               <a:rPr lang="en-GB" smtClean="0"/>
-              <a:t>17/02/2025</a:t>
+              <a:t>18/02/2025</a:t>
             </a:fld>
             <a:endParaRPr lang="en-GB"/>
           </a:p>
@@ -866,7 +866,7 @@
           <a:p>
             <a:fld id="{49E4927F-ADE1-49CD-A2B9-CD8CCD18392F}" type="datetimeFigureOut">
               <a:rPr lang="en-GB" smtClean="0"/>
-              <a:t>17/02/2025</a:t>
+              <a:t>18/02/2025</a:t>
             </a:fld>
             <a:endParaRPr lang="en-GB"/>
           </a:p>
@@ -1046,7 +1046,7 @@
           <a:p>
             <a:fld id="{49E4927F-ADE1-49CD-A2B9-CD8CCD18392F}" type="datetimeFigureOut">
               <a:rPr lang="en-GB" smtClean="0"/>
-              <a:t>17/02/2025</a:t>
+              <a:t>18/02/2025</a:t>
             </a:fld>
             <a:endParaRPr lang="en-GB"/>
           </a:p>
@@ -1216,7 +1216,7 @@
           <a:p>
             <a:fld id="{49E4927F-ADE1-49CD-A2B9-CD8CCD18392F}" type="datetimeFigureOut">
               <a:rPr lang="en-GB" smtClean="0"/>
-              <a:t>17/02/2025</a:t>
+              <a:t>18/02/2025</a:t>
             </a:fld>
             <a:endParaRPr lang="en-GB"/>
           </a:p>
@@ -1462,7 +1462,7 @@
           <a:p>
             <a:fld id="{49E4927F-ADE1-49CD-A2B9-CD8CCD18392F}" type="datetimeFigureOut">
               <a:rPr lang="en-GB" smtClean="0"/>
-              <a:t>17/02/2025</a:t>
+              <a:t>18/02/2025</a:t>
             </a:fld>
             <a:endParaRPr lang="en-GB"/>
           </a:p>
@@ -1694,7 +1694,7 @@
           <a:p>
             <a:fld id="{49E4927F-ADE1-49CD-A2B9-CD8CCD18392F}" type="datetimeFigureOut">
               <a:rPr lang="en-GB" smtClean="0"/>
-              <a:t>17/02/2025</a:t>
+              <a:t>18/02/2025</a:t>
             </a:fld>
             <a:endParaRPr lang="en-GB"/>
           </a:p>
@@ -2061,7 +2061,7 @@
           <a:p>
             <a:fld id="{49E4927F-ADE1-49CD-A2B9-CD8CCD18392F}" type="datetimeFigureOut">
               <a:rPr lang="en-GB" smtClean="0"/>
-              <a:t>17/02/2025</a:t>
+              <a:t>18/02/2025</a:t>
             </a:fld>
             <a:endParaRPr lang="en-GB"/>
           </a:p>
@@ -2179,7 +2179,7 @@
           <a:p>
             <a:fld id="{49E4927F-ADE1-49CD-A2B9-CD8CCD18392F}" type="datetimeFigureOut">
               <a:rPr lang="en-GB" smtClean="0"/>
-              <a:t>17/02/2025</a:t>
+              <a:t>18/02/2025</a:t>
             </a:fld>
             <a:endParaRPr lang="en-GB"/>
           </a:p>
@@ -2274,7 +2274,7 @@
           <a:p>
             <a:fld id="{49E4927F-ADE1-49CD-A2B9-CD8CCD18392F}" type="datetimeFigureOut">
               <a:rPr lang="en-GB" smtClean="0"/>
-              <a:t>17/02/2025</a:t>
+              <a:t>18/02/2025</a:t>
             </a:fld>
             <a:endParaRPr lang="en-GB"/>
           </a:p>
@@ -2551,7 +2551,7 @@
           <a:p>
             <a:fld id="{49E4927F-ADE1-49CD-A2B9-CD8CCD18392F}" type="datetimeFigureOut">
               <a:rPr lang="en-GB" smtClean="0"/>
-              <a:t>17/02/2025</a:t>
+              <a:t>18/02/2025</a:t>
             </a:fld>
             <a:endParaRPr lang="en-GB"/>
           </a:p>
@@ -2808,7 +2808,7 @@
           <a:p>
             <a:fld id="{49E4927F-ADE1-49CD-A2B9-CD8CCD18392F}" type="datetimeFigureOut">
               <a:rPr lang="en-GB" smtClean="0"/>
-              <a:t>17/02/2025</a:t>
+              <a:t>18/02/2025</a:t>
             </a:fld>
             <a:endParaRPr lang="en-GB"/>
           </a:p>
@@ -3021,7 +3021,7 @@
           <a:p>
             <a:fld id="{49E4927F-ADE1-49CD-A2B9-CD8CCD18392F}" type="datetimeFigureOut">
               <a:rPr lang="en-GB" smtClean="0"/>
-              <a:t>17/02/2025</a:t>
+              <a:t>18/02/2025</a:t>
             </a:fld>
             <a:endParaRPr lang="en-GB"/>
           </a:p>
@@ -4250,6 +4250,51 @@
             <a:r>
               <a:rPr lang="en-US" dirty="0"/>
               <a:t>3. UI OF WEBSITE</a:t>
+            </a:r>
+            <a:endParaRPr lang="en-GB" dirty="0"/>
+          </a:p>
+        </p:txBody>
+      </p:sp>
+      <p:sp>
+        <p:nvSpPr>
+          <p:cNvPr id="3" name="TextBox 2">
+            <a:extLst>
+              <a:ext uri="{FF2B5EF4-FFF2-40B4-BE49-F238E27FC236}">
+                <a16:creationId xmlns:a16="http://schemas.microsoft.com/office/drawing/2014/main" id="{0EFB95EB-D4FA-EE36-8135-342D2FBC0962}"/>
+              </a:ext>
+            </a:extLst>
+          </p:cNvPr>
+          <p:cNvSpPr txBox="1"/>
+          <p:nvPr/>
+        </p:nvSpPr>
+        <p:spPr>
+          <a:xfrm>
+            <a:off x="1624201" y="13900575"/>
+            <a:ext cx="4603568" cy="923330"/>
+          </a:xfrm>
+          <a:prstGeom prst="rect">
+            <a:avLst/>
+          </a:prstGeom>
+          <a:noFill/>
+        </p:spPr>
+        <p:txBody>
+          <a:bodyPr wrap="none" rtlCol="0">
+            <a:spAutoFit/>
+          </a:bodyPr>
+          <a:lstStyle/>
+          <a:p>
+            <a:r>
+              <a:rPr lang="en-US" dirty="0"/>
+              <a:t>Add graph for showing test and train success</a:t>
+            </a:r>
+          </a:p>
+          <a:p>
+            <a:endParaRPr lang="en-US" dirty="0"/>
+          </a:p>
+          <a:p>
+            <a:r>
+              <a:rPr lang="en-US" dirty="0"/>
+              <a:t>Add graph for best lime</a:t>
             </a:r>
             <a:endParaRPr lang="en-GB" dirty="0"/>
           </a:p>

</xml_diff>